<commit_message>
Corrections and new doc add
</commit_message>
<xml_diff>
--- a/Trabalho final de PAA.pptx
+++ b/Trabalho final de PAA.pptx
@@ -312,7 +312,7 @@
           <a:p>
             <a:fld id="{89418352-59E6-49B3-B66C-017E897E4FAD}" type="datetimeFigureOut">
               <a:rPr lang="pt-BR" smtClean="0"/>
-              <a:t>29/05/2020</a:t>
+              <a:t>03/11/2021</a:t>
             </a:fld>
             <a:endParaRPr lang="pt-BR"/>
           </a:p>
@@ -650,7 +650,7 @@
           <a:p>
             <a:fld id="{89418352-59E6-49B3-B66C-017E897E4FAD}" type="datetimeFigureOut">
               <a:rPr lang="pt-BR" smtClean="0"/>
-              <a:t>29/05/2020</a:t>
+              <a:t>03/11/2021</a:t>
             </a:fld>
             <a:endParaRPr lang="pt-BR"/>
           </a:p>
@@ -1051,7 +1051,7 @@
           <a:p>
             <a:fld id="{89418352-59E6-49B3-B66C-017E897E4FAD}" type="datetimeFigureOut">
               <a:rPr lang="pt-BR" smtClean="0"/>
-              <a:t>29/05/2020</a:t>
+              <a:t>03/11/2021</a:t>
             </a:fld>
             <a:endParaRPr lang="pt-BR"/>
           </a:p>
@@ -1387,7 +1387,7 @@
           <a:p>
             <a:fld id="{89418352-59E6-49B3-B66C-017E897E4FAD}" type="datetimeFigureOut">
               <a:rPr lang="pt-BR" smtClean="0"/>
-              <a:t>29/05/2020</a:t>
+              <a:t>03/11/2021</a:t>
             </a:fld>
             <a:endParaRPr lang="pt-BR"/>
           </a:p>
@@ -1707,7 +1707,7 @@
           <a:p>
             <a:fld id="{89418352-59E6-49B3-B66C-017E897E4FAD}" type="datetimeFigureOut">
               <a:rPr lang="pt-BR" smtClean="0"/>
-              <a:t>29/05/2020</a:t>
+              <a:t>03/11/2021</a:t>
             </a:fld>
             <a:endParaRPr lang="pt-BR"/>
           </a:p>
@@ -2103,7 +2103,7 @@
           <a:p>
             <a:fld id="{89418352-59E6-49B3-B66C-017E897E4FAD}" type="datetimeFigureOut">
               <a:rPr lang="pt-BR" smtClean="0"/>
-              <a:t>29/05/2020</a:t>
+              <a:t>03/11/2021</a:t>
             </a:fld>
             <a:endParaRPr lang="pt-BR"/>
           </a:p>
@@ -2360,7 +2360,7 @@
           <a:p>
             <a:fld id="{89418352-59E6-49B3-B66C-017E897E4FAD}" type="datetimeFigureOut">
               <a:rPr lang="pt-BR" smtClean="0"/>
-              <a:t>29/05/2020</a:t>
+              <a:t>03/11/2021</a:t>
             </a:fld>
             <a:endParaRPr lang="pt-BR"/>
           </a:p>
@@ -2622,7 +2622,7 @@
           <a:p>
             <a:fld id="{89418352-59E6-49B3-B66C-017E897E4FAD}" type="datetimeFigureOut">
               <a:rPr lang="pt-BR" smtClean="0"/>
-              <a:t>29/05/2020</a:t>
+              <a:t>03/11/2021</a:t>
             </a:fld>
             <a:endParaRPr lang="pt-BR"/>
           </a:p>
@@ -2884,7 +2884,7 @@
           <a:p>
             <a:fld id="{89418352-59E6-49B3-B66C-017E897E4FAD}" type="datetimeFigureOut">
               <a:rPr lang="pt-BR" smtClean="0"/>
-              <a:t>29/05/2020</a:t>
+              <a:t>03/11/2021</a:t>
             </a:fld>
             <a:endParaRPr lang="pt-BR"/>
           </a:p>
@@ -3213,7 +3213,7 @@
           <a:p>
             <a:fld id="{89418352-59E6-49B3-B66C-017E897E4FAD}" type="datetimeFigureOut">
               <a:rPr lang="pt-BR" smtClean="0"/>
-              <a:t>29/05/2020</a:t>
+              <a:t>03/11/2021</a:t>
             </a:fld>
             <a:endParaRPr lang="pt-BR"/>
           </a:p>
@@ -3536,7 +3536,7 @@
           <a:p>
             <a:fld id="{89418352-59E6-49B3-B66C-017E897E4FAD}" type="datetimeFigureOut">
               <a:rPr lang="pt-BR" smtClean="0"/>
-              <a:t>29/05/2020</a:t>
+              <a:t>03/11/2021</a:t>
             </a:fld>
             <a:endParaRPr lang="pt-BR"/>
           </a:p>
@@ -3993,7 +3993,7 @@
           <a:p>
             <a:fld id="{89418352-59E6-49B3-B66C-017E897E4FAD}" type="datetimeFigureOut">
               <a:rPr lang="pt-BR" smtClean="0"/>
-              <a:t>29/05/2020</a:t>
+              <a:t>03/11/2021</a:t>
             </a:fld>
             <a:endParaRPr lang="pt-BR"/>
           </a:p>
@@ -4198,7 +4198,7 @@
           <a:p>
             <a:fld id="{89418352-59E6-49B3-B66C-017E897E4FAD}" type="datetimeFigureOut">
               <a:rPr lang="pt-BR" smtClean="0"/>
-              <a:t>29/05/2020</a:t>
+              <a:t>03/11/2021</a:t>
             </a:fld>
             <a:endParaRPr lang="pt-BR"/>
           </a:p>
@@ -4375,7 +4375,7 @@
           <a:p>
             <a:fld id="{89418352-59E6-49B3-B66C-017E897E4FAD}" type="datetimeFigureOut">
               <a:rPr lang="pt-BR" smtClean="0"/>
-              <a:t>29/05/2020</a:t>
+              <a:t>03/11/2021</a:t>
             </a:fld>
             <a:endParaRPr lang="pt-BR"/>
           </a:p>
@@ -4708,7 +4708,7 @@
           <a:p>
             <a:fld id="{89418352-59E6-49B3-B66C-017E897E4FAD}" type="datetimeFigureOut">
               <a:rPr lang="pt-BR" smtClean="0"/>
-              <a:t>29/05/2020</a:t>
+              <a:t>03/11/2021</a:t>
             </a:fld>
             <a:endParaRPr lang="pt-BR"/>
           </a:p>
@@ -5053,7 +5053,7 @@
           <a:p>
             <a:fld id="{89418352-59E6-49B3-B66C-017E897E4FAD}" type="datetimeFigureOut">
               <a:rPr lang="pt-BR" smtClean="0"/>
-              <a:t>29/05/2020</a:t>
+              <a:t>03/11/2021</a:t>
             </a:fld>
             <a:endParaRPr lang="pt-BR"/>
           </a:p>
@@ -7170,7 +7170,7 @@
           <a:p>
             <a:fld id="{89418352-59E6-49B3-B66C-017E897E4FAD}" type="datetimeFigureOut">
               <a:rPr lang="pt-BR" smtClean="0"/>
-              <a:t>29/05/2020</a:t>
+              <a:t>03/11/2021</a:t>
             </a:fld>
             <a:endParaRPr lang="pt-BR"/>
           </a:p>
@@ -7738,34 +7738,23 @@
           <a:lstStyle/>
           <a:p>
             <a:r>
+              <a:rPr lang="pt-BR" smtClean="0"/>
+              <a:t>Aluno: </a:t>
+            </a:r>
+            <a:r>
               <a:rPr lang="pt-BR" dirty="0"/>
-              <a:t>Alunos: </a:t>
-            </a:r>
-            <a:r>
-              <a:rPr lang="pt-BR" dirty="0" err="1"/>
-              <a:t>Christy</a:t>
-            </a:r>
-            <a:r>
-              <a:rPr lang="pt-BR" dirty="0"/>
-              <a:t> Basílio da </a:t>
-            </a:r>
-            <a:r>
-              <a:rPr lang="pt-BR" dirty="0" smtClean="0"/>
-              <a:t>Silva</a:t>
-            </a:r>
-          </a:p>
-          <a:p>
-            <a:r>
-              <a:rPr lang="pt-BR" dirty="0" smtClean="0"/>
-              <a:t>              Marcos </a:t>
-            </a:r>
-            <a:r>
-              <a:rPr lang="pt-BR" dirty="0"/>
-              <a:t>Rodolfo C. G. </a:t>
+              <a:t>Marcos Rodolfo C. G. </a:t>
             </a:r>
             <a:r>
               <a:rPr lang="pt-BR" dirty="0" err="1"/>
               <a:t>Querino</a:t>
+            </a:r>
+            <a:endParaRPr lang="pt-BR" dirty="0" smtClean="0"/>
+          </a:p>
+          <a:p>
+            <a:r>
+              <a:rPr lang="pt-BR" dirty="0" smtClean="0"/>
+              <a:t>              </a:t>
             </a:r>
             <a:endParaRPr lang="pt-BR" dirty="0"/>
           </a:p>
@@ -8375,11 +8364,7 @@
             </a:r>
             <a:r>
               <a:rPr lang="pt-BR" dirty="0" smtClean="0"/>
-              <a:t>3[(n-1)+(n-1)] </a:t>
-            </a:r>
-            <a:r>
-              <a:rPr lang="pt-BR" dirty="0" smtClean="0"/>
-              <a:t>+ (log n) + (log n)+ </a:t>
+              <a:t>3[(n-1)+(n-1)] + (log n) + (log n)+ </a:t>
             </a:r>
             <a:r>
               <a:rPr lang="pt-BR" dirty="0"/>
@@ -9012,13 +8997,8 @@
             <a:pPr algn="just"/>
             <a:r>
               <a:rPr lang="pt-BR" dirty="0" smtClean="0"/>
-              <a:t>Primeiro, é criado um vetor chamado de subconjunto de tamanho igual a quantidade de vertices do grafo. Cada posição guardará um subconjunto que será cada </a:t>
-            </a:r>
-            <a:r>
-              <a:rPr lang="pt-BR" dirty="0" smtClean="0"/>
-              <a:t>aresta.</a:t>
-            </a:r>
-            <a:endParaRPr lang="pt-BR" dirty="0" smtClean="0"/>
+              <a:t>Primeiro, é criado um vetor chamado de subconjunto de tamanho igual a quantidade de vertices do grafo. Cada posição guardará um subconjunto que será cada aresta.</a:t>
+            </a:r>
           </a:p>
           <a:p>
             <a:pPr algn="just"/>
@@ -9707,23 +9687,7 @@
                   <a:srgbClr val="FF0000"/>
                 </a:solidFill>
               </a:rPr>
-              <a:t>(n-1</a:t>
-            </a:r>
-            <a:r>
-              <a:rPr lang="pt-BR" b="1" dirty="0" smtClean="0">
-                <a:solidFill>
-                  <a:srgbClr val="FF0000"/>
-                </a:solidFill>
-              </a:rPr>
-              <a:t>)+(n-1) </a:t>
-            </a:r>
-            <a:r>
-              <a:rPr lang="pt-BR" b="1" dirty="0" smtClean="0">
-                <a:solidFill>
-                  <a:srgbClr val="FF0000"/>
-                </a:solidFill>
-              </a:rPr>
-              <a:t>movimentos</a:t>
+              <a:t>(n-1)+(n-1) movimentos</a:t>
             </a:r>
             <a:endParaRPr lang="pt-BR" b="1" dirty="0"/>
           </a:p>
@@ -9784,23 +9748,7 @@
                   <a:srgbClr val="00B0F0"/>
                 </a:solidFill>
               </a:rPr>
-              <a:t>(n-1</a:t>
-            </a:r>
-            <a:r>
-              <a:rPr lang="pt-BR" b="1" dirty="0" smtClean="0">
-                <a:solidFill>
-                  <a:srgbClr val="00B0F0"/>
-                </a:solidFill>
-              </a:rPr>
-              <a:t>)+(n-1) </a:t>
-            </a:r>
-            <a:r>
-              <a:rPr lang="pt-BR" b="1" dirty="0" smtClean="0">
-                <a:solidFill>
-                  <a:srgbClr val="00B0F0"/>
-                </a:solidFill>
-              </a:rPr>
-              <a:t>comparações</a:t>
+              <a:t>(n-1)+(n-1) comparações</a:t>
             </a:r>
             <a:r>
               <a:rPr lang="pt-BR" b="1" dirty="0" smtClean="0"/>

</xml_diff>